<commit_message>
Agregadas notas al fulltrellotaskboard en powerpoint
</commit_message>
<xml_diff>
--- a/Iteracion3/Iteracion3_FullTrelloTaskBoard.pptx
+++ b/Iteracion3/Iteracion3_FullTrelloTaskBoard.pptx
@@ -5,24 +5,25 @@
     <p:sldMasterId id="2147483659" r:id="rId1"/>
   </p:sldMasterIdLst>
   <p:notesMasterIdLst>
-    <p:notesMasterId r:id="rId17"/>
+    <p:notesMasterId r:id="rId18"/>
   </p:notesMasterIdLst>
   <p:sldIdLst>
-    <p:sldId id="256" r:id="rId2"/>
-    <p:sldId id="257" r:id="rId3"/>
-    <p:sldId id="258" r:id="rId4"/>
-    <p:sldId id="259" r:id="rId5"/>
-    <p:sldId id="260" r:id="rId6"/>
-    <p:sldId id="261" r:id="rId7"/>
-    <p:sldId id="267" r:id="rId8"/>
-    <p:sldId id="268" r:id="rId9"/>
-    <p:sldId id="262" r:id="rId10"/>
-    <p:sldId id="263" r:id="rId11"/>
-    <p:sldId id="264" r:id="rId12"/>
-    <p:sldId id="265" r:id="rId13"/>
-    <p:sldId id="266" r:id="rId14"/>
-    <p:sldId id="269" r:id="rId15"/>
-    <p:sldId id="270" r:id="rId16"/>
+    <p:sldId id="271" r:id="rId2"/>
+    <p:sldId id="256" r:id="rId3"/>
+    <p:sldId id="257" r:id="rId4"/>
+    <p:sldId id="258" r:id="rId5"/>
+    <p:sldId id="259" r:id="rId6"/>
+    <p:sldId id="260" r:id="rId7"/>
+    <p:sldId id="261" r:id="rId8"/>
+    <p:sldId id="267" r:id="rId9"/>
+    <p:sldId id="268" r:id="rId10"/>
+    <p:sldId id="262" r:id="rId11"/>
+    <p:sldId id="263" r:id="rId12"/>
+    <p:sldId id="264" r:id="rId13"/>
+    <p:sldId id="265" r:id="rId14"/>
+    <p:sldId id="266" r:id="rId15"/>
+    <p:sldId id="269" r:id="rId16"/>
+    <p:sldId id="270" r:id="rId17"/>
   </p:sldIdLst>
   <p:sldSz cx="9144000" cy="5143500" type="screen16x9"/>
   <p:notesSz cx="6858000" cy="9144000"/>
@@ -7049,7 +7050,95 @@
   <p:cSld>
     <p:spTree>
       <p:nvGrpSpPr>
-        <p:cNvPr id="1" name="Shape 53"/>
+        <p:cNvPr id="1" name=""/>
+        <p:cNvGrpSpPr/>
+        <p:nvPr/>
+      </p:nvGrpSpPr>
+      <p:grpSpPr>
+        <a:xfrm>
+          <a:off x="0" y="0"/>
+          <a:ext cx="0" cy="0"/>
+          <a:chOff x="0" y="0"/>
+          <a:chExt cx="0" cy="0"/>
+        </a:xfrm>
+      </p:grpSpPr>
+      <p:pic>
+        <p:nvPicPr>
+          <p:cNvPr id="4" name="Picture 3">
+            <a:extLst>
+              <a:ext uri="{FF2B5EF4-FFF2-40B4-BE49-F238E27FC236}">
+                <a16:creationId xmlns:a16="http://schemas.microsoft.com/office/drawing/2014/main" id="{4742AC85-74C1-40F3-A8B6-D07DA9BC9BB7}"/>
+              </a:ext>
+            </a:extLst>
+          </p:cNvPr>
+          <p:cNvPicPr>
+            <a:picLocks noChangeAspect="1"/>
+          </p:cNvPicPr>
+          <p:nvPr/>
+        </p:nvPicPr>
+        <p:blipFill rotWithShape="1">
+          <a:blip r:embed="rId2"/>
+          <a:srcRect t="39565"/>
+          <a:stretch/>
+        </p:blipFill>
+        <p:spPr>
+          <a:xfrm>
+            <a:off x="5827058" y="268800"/>
+            <a:ext cx="3316942" cy="4605900"/>
+          </a:xfrm>
+          <a:prstGeom prst="rect">
+            <a:avLst/>
+          </a:prstGeom>
+        </p:spPr>
+      </p:pic>
+      <p:pic>
+        <p:nvPicPr>
+          <p:cNvPr id="5" name="Picture 4">
+            <a:extLst>
+              <a:ext uri="{FF2B5EF4-FFF2-40B4-BE49-F238E27FC236}">
+                <a16:creationId xmlns:a16="http://schemas.microsoft.com/office/drawing/2014/main" id="{794D4116-48A5-4092-8BC3-0688FE3885EA}"/>
+              </a:ext>
+            </a:extLst>
+          </p:cNvPr>
+          <p:cNvPicPr>
+            <a:picLocks noChangeAspect="1"/>
+          </p:cNvPicPr>
+          <p:nvPr/>
+        </p:nvPicPr>
+        <p:blipFill rotWithShape="1">
+          <a:blip r:embed="rId2"/>
+          <a:srcRect b="60436"/>
+          <a:stretch/>
+        </p:blipFill>
+        <p:spPr>
+          <a:xfrm>
+            <a:off x="154362" y="993962"/>
+            <a:ext cx="3471304" cy="3155576"/>
+          </a:xfrm>
+          <a:prstGeom prst="rect">
+            <a:avLst/>
+          </a:prstGeom>
+        </p:spPr>
+      </p:pic>
+    </p:spTree>
+    <p:extLst>
+      <p:ext uri="{BB962C8B-B14F-4D97-AF65-F5344CB8AC3E}">
+        <p14:creationId xmlns:p14="http://schemas.microsoft.com/office/powerpoint/2010/main" val="4273428279"/>
+      </p:ext>
+    </p:extLst>
+  </p:cSld>
+  <p:clrMapOvr>
+    <a:masterClrMapping/>
+  </p:clrMapOvr>
+</p:sld>
+</file>
+
+<file path=ppt/slides/slide10.xml><?xml version="1.0" encoding="utf-8"?>
+<p:sld xmlns:a="http://schemas.openxmlformats.org/drawingml/2006/main" xmlns:r="http://schemas.openxmlformats.org/officeDocument/2006/relationships" xmlns:p="http://schemas.openxmlformats.org/presentationml/2006/main">
+  <p:cSld>
+    <p:spTree>
+      <p:nvGrpSpPr>
+        <p:cNvPr id="1" name="Shape 89"/>
         <p:cNvGrpSpPr/>
         <p:nvPr/>
       </p:nvGrpSpPr>
@@ -7063,7 +7152,7 @@
       </p:grpSpPr>
       <p:sp>
         <p:nvSpPr>
-          <p:cNvPr id="54" name="Google Shape;54;p13"/>
+          <p:cNvPr id="90" name="Google Shape;90;p19"/>
           <p:cNvSpPr txBox="1"/>
           <p:nvPr/>
         </p:nvSpPr>
@@ -7097,7 +7186,7 @@
             </a:pPr>
             <a:r>
               <a:rPr lang="en"/>
-              <a:t>1 de Noviembre 2021</a:t>
+              <a:t>4 de Noviembre 2021</a:t>
             </a:r>
             <a:endParaRPr/>
           </a:p>
@@ -7105,7 +7194,7 @@
       </p:sp>
       <p:pic>
         <p:nvPicPr>
-          <p:cNvPr id="55" name="Google Shape;55;p13"/>
+          <p:cNvPr id="91" name="Google Shape;91;p19"/>
           <p:cNvPicPr preferRelativeResize="0"/>
           <p:nvPr/>
         </p:nvPicPr>
@@ -7119,8 +7208,8 @@
         </p:blipFill>
         <p:spPr>
           <a:xfrm>
-            <a:off x="0" y="1622300"/>
-            <a:ext cx="9144003" cy="1893104"/>
+            <a:off x="0" y="1612300"/>
+            <a:ext cx="9144003" cy="968873"/>
           </a:xfrm>
           <a:prstGeom prst="rect">
             <a:avLst/>
@@ -7139,7 +7228,7 @@
 </p:sld>
 </file>
 
-<file path=ppt/slides/slide10.xml><?xml version="1.0" encoding="utf-8"?>
+<file path=ppt/slides/slide11.xml><?xml version="1.0" encoding="utf-8"?>
 <p:sld xmlns:a="http://schemas.openxmlformats.org/drawingml/2006/main" xmlns:r="http://schemas.openxmlformats.org/officeDocument/2006/relationships" xmlns:p="http://schemas.openxmlformats.org/presentationml/2006/main">
   <p:cSld>
     <p:spTree>
@@ -7234,7 +7323,7 @@
 </p:sld>
 </file>
 
-<file path=ppt/slides/slide11.xml><?xml version="1.0" encoding="utf-8"?>
+<file path=ppt/slides/slide12.xml><?xml version="1.0" encoding="utf-8"?>
 <p:sld xmlns:a="http://schemas.openxmlformats.org/drawingml/2006/main" xmlns:r="http://schemas.openxmlformats.org/officeDocument/2006/relationships" xmlns:p="http://schemas.openxmlformats.org/presentationml/2006/main">
   <p:cSld>
     <p:spTree>
@@ -7329,7 +7418,7 @@
 </p:sld>
 </file>
 
-<file path=ppt/slides/slide12.xml><?xml version="1.0" encoding="utf-8"?>
+<file path=ppt/slides/slide13.xml><?xml version="1.0" encoding="utf-8"?>
 <p:sld xmlns:a="http://schemas.openxmlformats.org/drawingml/2006/main" xmlns:r="http://schemas.openxmlformats.org/officeDocument/2006/relationships" xmlns:p="http://schemas.openxmlformats.org/presentationml/2006/main">
   <p:cSld>
     <p:spTree>
@@ -7406,101 +7495,6 @@
           <a:xfrm>
             <a:off x="0" y="1607250"/>
             <a:ext cx="9144003" cy="1272483"/>
-          </a:xfrm>
-          <a:prstGeom prst="rect">
-            <a:avLst/>
-          </a:prstGeom>
-          <a:noFill/>
-          <a:ln>
-            <a:noFill/>
-          </a:ln>
-        </p:spPr>
-      </p:pic>
-    </p:spTree>
-  </p:cSld>
-  <p:clrMapOvr>
-    <a:masterClrMapping/>
-  </p:clrMapOvr>
-</p:sld>
-</file>
-
-<file path=ppt/slides/slide13.xml><?xml version="1.0" encoding="utf-8"?>
-<p:sld xmlns:a="http://schemas.openxmlformats.org/drawingml/2006/main" xmlns:r="http://schemas.openxmlformats.org/officeDocument/2006/relationships" xmlns:p="http://schemas.openxmlformats.org/presentationml/2006/main">
-  <p:cSld>
-    <p:spTree>
-      <p:nvGrpSpPr>
-        <p:cNvPr id="1" name="Shape 113"/>
-        <p:cNvGrpSpPr/>
-        <p:nvPr/>
-      </p:nvGrpSpPr>
-      <p:grpSpPr>
-        <a:xfrm>
-          <a:off x="0" y="0"/>
-          <a:ext cx="0" cy="0"/>
-          <a:chOff x="0" y="0"/>
-          <a:chExt cx="0" cy="0"/>
-        </a:xfrm>
-      </p:grpSpPr>
-      <p:sp>
-        <p:nvSpPr>
-          <p:cNvPr id="114" name="Google Shape;114;p23"/>
-          <p:cNvSpPr txBox="1"/>
-          <p:nvPr/>
-        </p:nvSpPr>
-        <p:spPr>
-          <a:xfrm>
-            <a:off x="3357300" y="1075850"/>
-            <a:ext cx="2429400" cy="400200"/>
-          </a:xfrm>
-          <a:prstGeom prst="rect">
-            <a:avLst/>
-          </a:prstGeom>
-          <a:noFill/>
-          <a:ln>
-            <a:noFill/>
-          </a:ln>
-        </p:spPr>
-        <p:txBody>
-          <a:bodyPr spcFirstLastPara="1" wrap="square" lIns="91425" tIns="91425" rIns="91425" bIns="91425" anchor="t" anchorCtr="0">
-            <a:spAutoFit/>
-          </a:bodyPr>
-          <a:lstStyle/>
-          <a:p>
-            <a:pPr marL="0" lvl="0" indent="0" algn="ctr" rtl="0">
-              <a:spcBef>
-                <a:spcPts val="0"/>
-              </a:spcBef>
-              <a:spcAft>
-                <a:spcPts val="0"/>
-              </a:spcAft>
-              <a:buNone/>
-            </a:pPr>
-            <a:r>
-              <a:rPr lang="en"/>
-              <a:t>5 de Noviembre 2021</a:t>
-            </a:r>
-            <a:endParaRPr/>
-          </a:p>
-        </p:txBody>
-      </p:sp>
-      <p:pic>
-        <p:nvPicPr>
-          <p:cNvPr id="115" name="Google Shape;115;p23"/>
-          <p:cNvPicPr preferRelativeResize="0"/>
-          <p:nvPr/>
-        </p:nvPicPr>
-        <p:blipFill>
-          <a:blip r:embed="rId3">
-            <a:alphaModFix/>
-          </a:blip>
-          <a:stretch>
-            <a:fillRect/>
-          </a:stretch>
-        </p:blipFill>
-        <p:spPr>
-          <a:xfrm>
-            <a:off x="0" y="1601300"/>
-            <a:ext cx="9144003" cy="1629661"/>
           </a:xfrm>
           <a:prstGeom prst="rect">
             <a:avLst/>
@@ -7580,40 +7574,33 @@
       </p:sp>
       <p:pic>
         <p:nvPicPr>
-          <p:cNvPr id="3" name="Picture 2">
-            <a:extLst>
-              <a:ext uri="{FF2B5EF4-FFF2-40B4-BE49-F238E27FC236}">
-                <a16:creationId xmlns:a16="http://schemas.microsoft.com/office/drawing/2014/main" id="{51E107A8-35F4-43DB-84EE-92CBE2986FEF}"/>
-              </a:ext>
-            </a:extLst>
-          </p:cNvPr>
-          <p:cNvPicPr>
-            <a:picLocks noChangeAspect="1"/>
-          </p:cNvPicPr>
+          <p:cNvPr id="115" name="Google Shape;115;p23"/>
+          <p:cNvPicPr preferRelativeResize="0"/>
           <p:nvPr/>
         </p:nvPicPr>
         <p:blipFill>
-          <a:blip r:embed="rId3"/>
+          <a:blip r:embed="rId3">
+            <a:alphaModFix/>
+          </a:blip>
           <a:stretch>
             <a:fillRect/>
           </a:stretch>
         </p:blipFill>
         <p:spPr>
           <a:xfrm>
-            <a:off x="0" y="1761063"/>
-            <a:ext cx="9144000" cy="1621373"/>
+            <a:off x="0" y="1601300"/>
+            <a:ext cx="9144003" cy="1629661"/>
           </a:xfrm>
           <a:prstGeom prst="rect">
             <a:avLst/>
           </a:prstGeom>
+          <a:noFill/>
+          <a:ln>
+            <a:noFill/>
+          </a:ln>
         </p:spPr>
       </p:pic>
     </p:spTree>
-    <p:extLst>
-      <p:ext uri="{BB962C8B-B14F-4D97-AF65-F5344CB8AC3E}">
-        <p14:creationId xmlns:p14="http://schemas.microsoft.com/office/powerpoint/2010/main" val="2305526504"/>
-      </p:ext>
-    </p:extLst>
   </p:cSld>
   <p:clrMapOvr>
     <a:masterClrMapping/>
@@ -7682,6 +7669,108 @@
       </p:sp>
       <p:pic>
         <p:nvPicPr>
+          <p:cNvPr id="3" name="Picture 2">
+            <a:extLst>
+              <a:ext uri="{FF2B5EF4-FFF2-40B4-BE49-F238E27FC236}">
+                <a16:creationId xmlns:a16="http://schemas.microsoft.com/office/drawing/2014/main" id="{51E107A8-35F4-43DB-84EE-92CBE2986FEF}"/>
+              </a:ext>
+            </a:extLst>
+          </p:cNvPr>
+          <p:cNvPicPr>
+            <a:picLocks noChangeAspect="1"/>
+          </p:cNvPicPr>
+          <p:nvPr/>
+        </p:nvPicPr>
+        <p:blipFill>
+          <a:blip r:embed="rId3"/>
+          <a:stretch>
+            <a:fillRect/>
+          </a:stretch>
+        </p:blipFill>
+        <p:spPr>
+          <a:xfrm>
+            <a:off x="0" y="1761063"/>
+            <a:ext cx="9144000" cy="1621373"/>
+          </a:xfrm>
+          <a:prstGeom prst="rect">
+            <a:avLst/>
+          </a:prstGeom>
+        </p:spPr>
+      </p:pic>
+    </p:spTree>
+    <p:extLst>
+      <p:ext uri="{BB962C8B-B14F-4D97-AF65-F5344CB8AC3E}">
+        <p14:creationId xmlns:p14="http://schemas.microsoft.com/office/powerpoint/2010/main" val="2305526504"/>
+      </p:ext>
+    </p:extLst>
+  </p:cSld>
+  <p:clrMapOvr>
+    <a:masterClrMapping/>
+  </p:clrMapOvr>
+</p:sld>
+</file>
+
+<file path=ppt/slides/slide16.xml><?xml version="1.0" encoding="utf-8"?>
+<p:sld xmlns:a="http://schemas.openxmlformats.org/drawingml/2006/main" xmlns:r="http://schemas.openxmlformats.org/officeDocument/2006/relationships" xmlns:p="http://schemas.openxmlformats.org/presentationml/2006/main">
+  <p:cSld>
+    <p:spTree>
+      <p:nvGrpSpPr>
+        <p:cNvPr id="1" name="Shape 113"/>
+        <p:cNvGrpSpPr/>
+        <p:nvPr/>
+      </p:nvGrpSpPr>
+      <p:grpSpPr>
+        <a:xfrm>
+          <a:off x="0" y="0"/>
+          <a:ext cx="0" cy="0"/>
+          <a:chOff x="0" y="0"/>
+          <a:chExt cx="0" cy="0"/>
+        </a:xfrm>
+      </p:grpSpPr>
+      <p:sp>
+        <p:nvSpPr>
+          <p:cNvPr id="114" name="Google Shape;114;p23"/>
+          <p:cNvSpPr txBox="1"/>
+          <p:nvPr/>
+        </p:nvSpPr>
+        <p:spPr>
+          <a:xfrm>
+            <a:off x="3357300" y="1075850"/>
+            <a:ext cx="2429400" cy="400200"/>
+          </a:xfrm>
+          <a:prstGeom prst="rect">
+            <a:avLst/>
+          </a:prstGeom>
+          <a:noFill/>
+          <a:ln>
+            <a:noFill/>
+          </a:ln>
+        </p:spPr>
+        <p:txBody>
+          <a:bodyPr spcFirstLastPara="1" wrap="square" lIns="91425" tIns="91425" rIns="91425" bIns="91425" anchor="t" anchorCtr="0">
+            <a:spAutoFit/>
+          </a:bodyPr>
+          <a:lstStyle/>
+          <a:p>
+            <a:pPr marL="0" lvl="0" indent="0" algn="ctr" rtl="0">
+              <a:spcBef>
+                <a:spcPts val="0"/>
+              </a:spcBef>
+              <a:spcAft>
+                <a:spcPts val="0"/>
+              </a:spcAft>
+              <a:buNone/>
+            </a:pPr>
+            <a:r>
+              <a:rPr lang="en"/>
+              <a:t>5 de Noviembre 2021</a:t>
+            </a:r>
+            <a:endParaRPr/>
+          </a:p>
+        </p:txBody>
+      </p:sp>
+      <p:pic>
+        <p:nvPicPr>
           <p:cNvPr id="4" name="Picture 3">
             <a:extLst>
               <a:ext uri="{FF2B5EF4-FFF2-40B4-BE49-F238E27FC236}">
@@ -7724,6 +7813,101 @@
 </file>
 
 <file path=ppt/slides/slide2.xml><?xml version="1.0" encoding="utf-8"?>
+<p:sld xmlns:a="http://schemas.openxmlformats.org/drawingml/2006/main" xmlns:r="http://schemas.openxmlformats.org/officeDocument/2006/relationships" xmlns:p="http://schemas.openxmlformats.org/presentationml/2006/main">
+  <p:cSld>
+    <p:spTree>
+      <p:nvGrpSpPr>
+        <p:cNvPr id="1" name="Shape 53"/>
+        <p:cNvGrpSpPr/>
+        <p:nvPr/>
+      </p:nvGrpSpPr>
+      <p:grpSpPr>
+        <a:xfrm>
+          <a:off x="0" y="0"/>
+          <a:ext cx="0" cy="0"/>
+          <a:chOff x="0" y="0"/>
+          <a:chExt cx="0" cy="0"/>
+        </a:xfrm>
+      </p:grpSpPr>
+      <p:sp>
+        <p:nvSpPr>
+          <p:cNvPr id="54" name="Google Shape;54;p13"/>
+          <p:cNvSpPr txBox="1"/>
+          <p:nvPr/>
+        </p:nvSpPr>
+        <p:spPr>
+          <a:xfrm>
+            <a:off x="3357300" y="1075850"/>
+            <a:ext cx="2429400" cy="400200"/>
+          </a:xfrm>
+          <a:prstGeom prst="rect">
+            <a:avLst/>
+          </a:prstGeom>
+          <a:noFill/>
+          <a:ln>
+            <a:noFill/>
+          </a:ln>
+        </p:spPr>
+        <p:txBody>
+          <a:bodyPr spcFirstLastPara="1" wrap="square" lIns="91425" tIns="91425" rIns="91425" bIns="91425" anchor="t" anchorCtr="0">
+            <a:spAutoFit/>
+          </a:bodyPr>
+          <a:lstStyle/>
+          <a:p>
+            <a:pPr marL="0" lvl="0" indent="0" algn="ctr" rtl="0">
+              <a:spcBef>
+                <a:spcPts val="0"/>
+              </a:spcBef>
+              <a:spcAft>
+                <a:spcPts val="0"/>
+              </a:spcAft>
+              <a:buNone/>
+            </a:pPr>
+            <a:r>
+              <a:rPr lang="en"/>
+              <a:t>1 de Noviembre 2021</a:t>
+            </a:r>
+            <a:endParaRPr/>
+          </a:p>
+        </p:txBody>
+      </p:sp>
+      <p:pic>
+        <p:nvPicPr>
+          <p:cNvPr id="55" name="Google Shape;55;p13"/>
+          <p:cNvPicPr preferRelativeResize="0"/>
+          <p:nvPr/>
+        </p:nvPicPr>
+        <p:blipFill>
+          <a:blip r:embed="rId3">
+            <a:alphaModFix/>
+          </a:blip>
+          <a:stretch>
+            <a:fillRect/>
+          </a:stretch>
+        </p:blipFill>
+        <p:spPr>
+          <a:xfrm>
+            <a:off x="0" y="1622300"/>
+            <a:ext cx="9144003" cy="1893104"/>
+          </a:xfrm>
+          <a:prstGeom prst="rect">
+            <a:avLst/>
+          </a:prstGeom>
+          <a:noFill/>
+          <a:ln>
+            <a:noFill/>
+          </a:ln>
+        </p:spPr>
+      </p:pic>
+    </p:spTree>
+  </p:cSld>
+  <p:clrMapOvr>
+    <a:masterClrMapping/>
+  </p:clrMapOvr>
+</p:sld>
+</file>
+
+<file path=ppt/slides/slide3.xml><?xml version="1.0" encoding="utf-8"?>
 <p:sld xmlns:a="http://schemas.openxmlformats.org/drawingml/2006/main" xmlns:r="http://schemas.openxmlformats.org/officeDocument/2006/relationships" xmlns:p="http://schemas.openxmlformats.org/presentationml/2006/main">
   <p:cSld>
     <p:spTree>
@@ -7818,7 +8002,7 @@
 </p:sld>
 </file>
 
-<file path=ppt/slides/slide3.xml><?xml version="1.0" encoding="utf-8"?>
+<file path=ppt/slides/slide4.xml><?xml version="1.0" encoding="utf-8"?>
 <p:sld xmlns:a="http://schemas.openxmlformats.org/drawingml/2006/main" xmlns:r="http://schemas.openxmlformats.org/officeDocument/2006/relationships" xmlns:p="http://schemas.openxmlformats.org/presentationml/2006/main">
   <p:cSld>
     <p:spTree>
@@ -7913,7 +8097,7 @@
 </p:sld>
 </file>
 
-<file path=ppt/slides/slide4.xml><?xml version="1.0" encoding="utf-8"?>
+<file path=ppt/slides/slide5.xml><?xml version="1.0" encoding="utf-8"?>
 <p:sld xmlns:a="http://schemas.openxmlformats.org/drawingml/2006/main" xmlns:r="http://schemas.openxmlformats.org/officeDocument/2006/relationships" xmlns:p="http://schemas.openxmlformats.org/presentationml/2006/main">
   <p:cSld>
     <p:spTree>
@@ -8008,7 +8192,7 @@
 </p:sld>
 </file>
 
-<file path=ppt/slides/slide5.xml><?xml version="1.0" encoding="utf-8"?>
+<file path=ppt/slides/slide6.xml><?xml version="1.0" encoding="utf-8"?>
 <p:sld xmlns:a="http://schemas.openxmlformats.org/drawingml/2006/main" xmlns:r="http://schemas.openxmlformats.org/officeDocument/2006/relationships" xmlns:p="http://schemas.openxmlformats.org/presentationml/2006/main">
   <p:cSld>
     <p:spTree>
@@ -8085,101 +8269,6 @@
           <a:xfrm>
             <a:off x="0" y="1628450"/>
             <a:ext cx="9144003" cy="982271"/>
-          </a:xfrm>
-          <a:prstGeom prst="rect">
-            <a:avLst/>
-          </a:prstGeom>
-          <a:noFill/>
-          <a:ln>
-            <a:noFill/>
-          </a:ln>
-        </p:spPr>
-      </p:pic>
-    </p:spTree>
-  </p:cSld>
-  <p:clrMapOvr>
-    <a:masterClrMapping/>
-  </p:clrMapOvr>
-</p:sld>
-</file>
-
-<file path=ppt/slides/slide6.xml><?xml version="1.0" encoding="utf-8"?>
-<p:sld xmlns:a="http://schemas.openxmlformats.org/drawingml/2006/main" xmlns:r="http://schemas.openxmlformats.org/officeDocument/2006/relationships" xmlns:p="http://schemas.openxmlformats.org/presentationml/2006/main">
-  <p:cSld>
-    <p:spTree>
-      <p:nvGrpSpPr>
-        <p:cNvPr id="1" name="Shape 83"/>
-        <p:cNvGrpSpPr/>
-        <p:nvPr/>
-      </p:nvGrpSpPr>
-      <p:grpSpPr>
-        <a:xfrm>
-          <a:off x="0" y="0"/>
-          <a:ext cx="0" cy="0"/>
-          <a:chOff x="0" y="0"/>
-          <a:chExt cx="0" cy="0"/>
-        </a:xfrm>
-      </p:grpSpPr>
-      <p:sp>
-        <p:nvSpPr>
-          <p:cNvPr id="84" name="Google Shape;84;p18"/>
-          <p:cNvSpPr txBox="1"/>
-          <p:nvPr/>
-        </p:nvSpPr>
-        <p:spPr>
-          <a:xfrm>
-            <a:off x="3357300" y="1075850"/>
-            <a:ext cx="2429400" cy="400200"/>
-          </a:xfrm>
-          <a:prstGeom prst="rect">
-            <a:avLst/>
-          </a:prstGeom>
-          <a:noFill/>
-          <a:ln>
-            <a:noFill/>
-          </a:ln>
-        </p:spPr>
-        <p:txBody>
-          <a:bodyPr spcFirstLastPara="1" wrap="square" lIns="91425" tIns="91425" rIns="91425" bIns="91425" anchor="t" anchorCtr="0">
-            <a:spAutoFit/>
-          </a:bodyPr>
-          <a:lstStyle/>
-          <a:p>
-            <a:pPr marL="0" lvl="0" indent="0" algn="ctr" rtl="0">
-              <a:spcBef>
-                <a:spcPts val="0"/>
-              </a:spcBef>
-              <a:spcAft>
-                <a:spcPts val="0"/>
-              </a:spcAft>
-              <a:buNone/>
-            </a:pPr>
-            <a:r>
-              <a:rPr lang="en"/>
-              <a:t>1 de Noviembre 2021</a:t>
-            </a:r>
-            <a:endParaRPr/>
-          </a:p>
-        </p:txBody>
-      </p:sp>
-      <p:pic>
-        <p:nvPicPr>
-          <p:cNvPr id="85" name="Google Shape;85;p18"/>
-          <p:cNvPicPr preferRelativeResize="0"/>
-          <p:nvPr/>
-        </p:nvPicPr>
-        <p:blipFill>
-          <a:blip r:embed="rId3">
-            <a:alphaModFix/>
-          </a:blip>
-          <a:stretch>
-            <a:fillRect/>
-          </a:stretch>
-        </p:blipFill>
-        <p:spPr>
-          <a:xfrm>
-            <a:off x="0" y="1628450"/>
-            <a:ext cx="9144003" cy="937630"/>
           </a:xfrm>
           <a:prstGeom prst="rect">
             <a:avLst/>
@@ -8259,40 +8348,33 @@
       </p:sp>
       <p:pic>
         <p:nvPicPr>
-          <p:cNvPr id="3" name="Picture 2">
-            <a:extLst>
-              <a:ext uri="{FF2B5EF4-FFF2-40B4-BE49-F238E27FC236}">
-                <a16:creationId xmlns:a16="http://schemas.microsoft.com/office/drawing/2014/main" id="{FC0BDAE3-6808-4D1D-9CCF-97EE3709D0C9}"/>
-              </a:ext>
-            </a:extLst>
-          </p:cNvPr>
-          <p:cNvPicPr>
-            <a:picLocks noChangeAspect="1"/>
-          </p:cNvPicPr>
+          <p:cNvPr id="85" name="Google Shape;85;p18"/>
+          <p:cNvPicPr preferRelativeResize="0"/>
           <p:nvPr/>
         </p:nvPicPr>
         <p:blipFill>
-          <a:blip r:embed="rId3"/>
+          <a:blip r:embed="rId3">
+            <a:alphaModFix/>
+          </a:blip>
           <a:stretch>
             <a:fillRect/>
           </a:stretch>
         </p:blipFill>
         <p:spPr>
           <a:xfrm>
-            <a:off x="0" y="1737837"/>
-            <a:ext cx="9144000" cy="1004437"/>
+            <a:off x="0" y="1628450"/>
+            <a:ext cx="9144003" cy="937630"/>
           </a:xfrm>
           <a:prstGeom prst="rect">
             <a:avLst/>
           </a:prstGeom>
+          <a:noFill/>
+          <a:ln>
+            <a:noFill/>
+          </a:ln>
         </p:spPr>
       </p:pic>
     </p:spTree>
-    <p:extLst>
-      <p:ext uri="{BB962C8B-B14F-4D97-AF65-F5344CB8AC3E}">
-        <p14:creationId xmlns:p14="http://schemas.microsoft.com/office/powerpoint/2010/main" val="4167759364"/>
-      </p:ext>
-    </p:extLst>
   </p:cSld>
   <p:clrMapOvr>
     <a:masterClrMapping/>
@@ -8361,6 +8443,108 @@
       </p:sp>
       <p:pic>
         <p:nvPicPr>
+          <p:cNvPr id="3" name="Picture 2">
+            <a:extLst>
+              <a:ext uri="{FF2B5EF4-FFF2-40B4-BE49-F238E27FC236}">
+                <a16:creationId xmlns:a16="http://schemas.microsoft.com/office/drawing/2014/main" id="{FC0BDAE3-6808-4D1D-9CCF-97EE3709D0C9}"/>
+              </a:ext>
+            </a:extLst>
+          </p:cNvPr>
+          <p:cNvPicPr>
+            <a:picLocks noChangeAspect="1"/>
+          </p:cNvPicPr>
+          <p:nvPr/>
+        </p:nvPicPr>
+        <p:blipFill>
+          <a:blip r:embed="rId3"/>
+          <a:stretch>
+            <a:fillRect/>
+          </a:stretch>
+        </p:blipFill>
+        <p:spPr>
+          <a:xfrm>
+            <a:off x="0" y="1737837"/>
+            <a:ext cx="9144000" cy="1004437"/>
+          </a:xfrm>
+          <a:prstGeom prst="rect">
+            <a:avLst/>
+          </a:prstGeom>
+        </p:spPr>
+      </p:pic>
+    </p:spTree>
+    <p:extLst>
+      <p:ext uri="{BB962C8B-B14F-4D97-AF65-F5344CB8AC3E}">
+        <p14:creationId xmlns:p14="http://schemas.microsoft.com/office/powerpoint/2010/main" val="4167759364"/>
+      </p:ext>
+    </p:extLst>
+  </p:cSld>
+  <p:clrMapOvr>
+    <a:masterClrMapping/>
+  </p:clrMapOvr>
+</p:sld>
+</file>
+
+<file path=ppt/slides/slide9.xml><?xml version="1.0" encoding="utf-8"?>
+<p:sld xmlns:a="http://schemas.openxmlformats.org/drawingml/2006/main" xmlns:r="http://schemas.openxmlformats.org/officeDocument/2006/relationships" xmlns:p="http://schemas.openxmlformats.org/presentationml/2006/main">
+  <p:cSld>
+    <p:spTree>
+      <p:nvGrpSpPr>
+        <p:cNvPr id="1" name="Shape 83"/>
+        <p:cNvGrpSpPr/>
+        <p:nvPr/>
+      </p:nvGrpSpPr>
+      <p:grpSpPr>
+        <a:xfrm>
+          <a:off x="0" y="0"/>
+          <a:ext cx="0" cy="0"/>
+          <a:chOff x="0" y="0"/>
+          <a:chExt cx="0" cy="0"/>
+        </a:xfrm>
+      </p:grpSpPr>
+      <p:sp>
+        <p:nvSpPr>
+          <p:cNvPr id="84" name="Google Shape;84;p18"/>
+          <p:cNvSpPr txBox="1"/>
+          <p:nvPr/>
+        </p:nvSpPr>
+        <p:spPr>
+          <a:xfrm>
+            <a:off x="3357300" y="1075850"/>
+            <a:ext cx="2429400" cy="400200"/>
+          </a:xfrm>
+          <a:prstGeom prst="rect">
+            <a:avLst/>
+          </a:prstGeom>
+          <a:noFill/>
+          <a:ln>
+            <a:noFill/>
+          </a:ln>
+        </p:spPr>
+        <p:txBody>
+          <a:bodyPr spcFirstLastPara="1" wrap="square" lIns="91425" tIns="91425" rIns="91425" bIns="91425" anchor="t" anchorCtr="0">
+            <a:spAutoFit/>
+          </a:bodyPr>
+          <a:lstStyle/>
+          <a:p>
+            <a:pPr marL="0" lvl="0" indent="0" algn="ctr" rtl="0">
+              <a:spcBef>
+                <a:spcPts val="0"/>
+              </a:spcBef>
+              <a:spcAft>
+                <a:spcPts val="0"/>
+              </a:spcAft>
+              <a:buNone/>
+            </a:pPr>
+            <a:r>
+              <a:rPr lang="en"/>
+              <a:t>1 de Noviembre 2021</a:t>
+            </a:r>
+            <a:endParaRPr/>
+          </a:p>
+        </p:txBody>
+      </p:sp>
+      <p:pic>
+        <p:nvPicPr>
           <p:cNvPr id="4" name="Picture 3">
             <a:extLst>
               <a:ext uri="{FF2B5EF4-FFF2-40B4-BE49-F238E27FC236}">
@@ -8395,101 +8579,6 @@
         <p14:creationId xmlns:p14="http://schemas.microsoft.com/office/powerpoint/2010/main" val="4040050063"/>
       </p:ext>
     </p:extLst>
-  </p:cSld>
-  <p:clrMapOvr>
-    <a:masterClrMapping/>
-  </p:clrMapOvr>
-</p:sld>
-</file>
-
-<file path=ppt/slides/slide9.xml><?xml version="1.0" encoding="utf-8"?>
-<p:sld xmlns:a="http://schemas.openxmlformats.org/drawingml/2006/main" xmlns:r="http://schemas.openxmlformats.org/officeDocument/2006/relationships" xmlns:p="http://schemas.openxmlformats.org/presentationml/2006/main">
-  <p:cSld>
-    <p:spTree>
-      <p:nvGrpSpPr>
-        <p:cNvPr id="1" name="Shape 89"/>
-        <p:cNvGrpSpPr/>
-        <p:nvPr/>
-      </p:nvGrpSpPr>
-      <p:grpSpPr>
-        <a:xfrm>
-          <a:off x="0" y="0"/>
-          <a:ext cx="0" cy="0"/>
-          <a:chOff x="0" y="0"/>
-          <a:chExt cx="0" cy="0"/>
-        </a:xfrm>
-      </p:grpSpPr>
-      <p:sp>
-        <p:nvSpPr>
-          <p:cNvPr id="90" name="Google Shape;90;p19"/>
-          <p:cNvSpPr txBox="1"/>
-          <p:nvPr/>
-        </p:nvSpPr>
-        <p:spPr>
-          <a:xfrm>
-            <a:off x="3357300" y="1075850"/>
-            <a:ext cx="2429400" cy="400200"/>
-          </a:xfrm>
-          <a:prstGeom prst="rect">
-            <a:avLst/>
-          </a:prstGeom>
-          <a:noFill/>
-          <a:ln>
-            <a:noFill/>
-          </a:ln>
-        </p:spPr>
-        <p:txBody>
-          <a:bodyPr spcFirstLastPara="1" wrap="square" lIns="91425" tIns="91425" rIns="91425" bIns="91425" anchor="t" anchorCtr="0">
-            <a:spAutoFit/>
-          </a:bodyPr>
-          <a:lstStyle/>
-          <a:p>
-            <a:pPr marL="0" lvl="0" indent="0" algn="ctr" rtl="0">
-              <a:spcBef>
-                <a:spcPts val="0"/>
-              </a:spcBef>
-              <a:spcAft>
-                <a:spcPts val="0"/>
-              </a:spcAft>
-              <a:buNone/>
-            </a:pPr>
-            <a:r>
-              <a:rPr lang="en"/>
-              <a:t>4 de Noviembre 2021</a:t>
-            </a:r>
-            <a:endParaRPr/>
-          </a:p>
-        </p:txBody>
-      </p:sp>
-      <p:pic>
-        <p:nvPicPr>
-          <p:cNvPr id="91" name="Google Shape;91;p19"/>
-          <p:cNvPicPr preferRelativeResize="0"/>
-          <p:nvPr/>
-        </p:nvPicPr>
-        <p:blipFill>
-          <a:blip r:embed="rId3">
-            <a:alphaModFix/>
-          </a:blip>
-          <a:stretch>
-            <a:fillRect/>
-          </a:stretch>
-        </p:blipFill>
-        <p:spPr>
-          <a:xfrm>
-            <a:off x="0" y="1612300"/>
-            <a:ext cx="9144003" cy="968873"/>
-          </a:xfrm>
-          <a:prstGeom prst="rect">
-            <a:avLst/>
-          </a:prstGeom>
-          <a:noFill/>
-          <a:ln>
-            <a:noFill/>
-          </a:ln>
-        </p:spPr>
-      </p:pic>
-    </p:spTree>
   </p:cSld>
   <p:clrMapOvr>
     <a:masterClrMapping/>

</xml_diff>